<commit_message>
Fehler in Präsentation korrigiert
</commit_message>
<xml_diff>
--- a/Präsentation Bacheloreminar Max Freudenberg.pptx
+++ b/Präsentation Bacheloreminar Max Freudenberg.pptx
@@ -9990,6 +9990,7 @@
           </a:bodyPr>
           <a:lstStyle/>
           <a:p>
+            <a:pPr algn="ctr"/>
             <a:r>
               <a:rPr lang="de-DE" sz="700" dirty="0"/>
               <a:t>Delete Personalnummer.xlsx</a:t>
@@ -10025,6 +10026,7 @@
           </a:bodyPr>
           <a:lstStyle/>
           <a:p>
+            <a:pPr algn="ctr"/>
             <a:r>
               <a:rPr lang="de-DE" sz="700" dirty="0"/>
               <a:t>Insert Mitarbeiter.xlsx</a:t>
@@ -10046,8 +10048,8 @@
         </p:nvSpPr>
         <p:spPr>
           <a:xfrm>
-            <a:off x="785989" y="2246921"/>
-            <a:ext cx="1542282" cy="200055"/>
+            <a:off x="500656" y="2246921"/>
+            <a:ext cx="1983112" cy="200055"/>
           </a:xfrm>
           <a:prstGeom prst="rect">
             <a:avLst/>
@@ -10060,9 +10062,10 @@
           </a:bodyPr>
           <a:lstStyle/>
           <a:p>
+            <a:pPr algn="ctr"/>
             <a:r>
               <a:rPr lang="de-DE" sz="700" dirty="0"/>
-              <a:t>Insert ges. Krankenkasse.xlsx</a:t>
+              <a:t>Insert gesetzliche Krankenkasse.xlsx</a:t>
             </a:r>
           </a:p>
         </p:txBody>
@@ -10095,9 +10098,10 @@
           </a:bodyPr>
           <a:lstStyle/>
           <a:p>
+            <a:pPr algn="ctr"/>
             <a:r>
               <a:rPr lang="de-DE" sz="700" dirty="0"/>
-              <a:t>Update Krankenversicherungsbeitraege.xlsx</a:t>
+              <a:t>Update adresse.xlsx</a:t>
             </a:r>
           </a:p>
         </p:txBody>

</xml_diff>

<commit_message>
Folie 'Erhoffe Ergebnisse' für Bachelorseminar ergänzt
</commit_message>
<xml_diff>
--- a/Präsentation Bacheloreminar Max Freudenberg.pptx
+++ b/Präsentation Bacheloreminar Max Freudenberg.pptx
@@ -5,7 +5,7 @@
     <p:sldMasterId id="2147483648" r:id="rId1"/>
   </p:sldMasterIdLst>
   <p:notesMasterIdLst>
-    <p:notesMasterId r:id="rId13"/>
+    <p:notesMasterId r:id="rId14"/>
   </p:notesMasterIdLst>
   <p:sldIdLst>
     <p:sldId id="321" r:id="rId2"/>
@@ -18,7 +18,8 @@
     <p:sldId id="324" r:id="rId9"/>
     <p:sldId id="325" r:id="rId10"/>
     <p:sldId id="326" r:id="rId11"/>
-    <p:sldId id="272" r:id="rId12"/>
+    <p:sldId id="327" r:id="rId12"/>
+    <p:sldId id="272" r:id="rId13"/>
   </p:sldIdLst>
   <p:sldSz cx="9144000" cy="5143500" type="screen16x9"/>
   <p:notesSz cx="6858000" cy="9144000"/>
@@ -9836,7 +9837,7 @@
           <a:p>
             <a:r>
               <a:rPr lang="de-DE" altLang="de-DE" sz="2000" dirty="0"/>
-              <a:t>5. Prozess des Datenimports</a:t>
+              <a:t>5 Prozess des Datenimports</a:t>
             </a:r>
             <a:endParaRPr lang="de-DE" altLang="de-DE" sz="1800" dirty="0"/>
           </a:p>
@@ -11324,6 +11325,697 @@
 </file>
 
 <file path=ppt/slides/slide11.xml><?xml version="1.0" encoding="utf-8"?>
+<p:sld xmlns:a="http://schemas.openxmlformats.org/drawingml/2006/main" xmlns:r="http://schemas.openxmlformats.org/officeDocument/2006/relationships" xmlns:p="http://schemas.openxmlformats.org/presentationml/2006/main">
+  <p:cSld>
+    <p:spTree>
+      <p:nvGrpSpPr>
+        <p:cNvPr id="1" name=""/>
+        <p:cNvGrpSpPr/>
+        <p:nvPr/>
+      </p:nvGrpSpPr>
+      <p:grpSpPr>
+        <a:xfrm>
+          <a:off x="0" y="0"/>
+          <a:ext cx="0" cy="0"/>
+          <a:chOff x="0" y="0"/>
+          <a:chExt cx="0" cy="0"/>
+        </a:xfrm>
+      </p:grpSpPr>
+      <p:sp>
+        <p:nvSpPr>
+          <p:cNvPr id="20484" name="Foliennummernplatzhalter 6">
+            <a:extLst>
+              <a:ext uri="{FF2B5EF4-FFF2-40B4-BE49-F238E27FC236}">
+                <a16:creationId xmlns:a16="http://schemas.microsoft.com/office/drawing/2014/main" id="{4A5C8648-3647-4EE0-9034-0992D387A644}"/>
+              </a:ext>
+            </a:extLst>
+          </p:cNvPr>
+          <p:cNvSpPr>
+            <a:spLocks noGrp="1"/>
+          </p:cNvSpPr>
+          <p:nvPr>
+            <p:ph type="sldNum" sz="quarter" idx="16"/>
+          </p:nvPr>
+        </p:nvSpPr>
+        <p:spPr bwMode="auto">
+          <a:noFill/>
+          <a:extLst>
+            <a:ext uri="{909E8E84-426E-40DD-AFC4-6F175D3DCCD1}">
+              <a14:hiddenFill xmlns:a14="http://schemas.microsoft.com/office/drawing/2010/main">
+                <a:solidFill>
+                  <a:srgbClr val="FFFFFF"/>
+                </a:solidFill>
+              </a14:hiddenFill>
+            </a:ext>
+            <a:ext uri="{91240B29-F687-4F45-9708-019B960494DF}">
+              <a14:hiddenLine xmlns:a14="http://schemas.microsoft.com/office/drawing/2010/main" w="9525">
+                <a:solidFill>
+                  <a:srgbClr val="000000"/>
+                </a:solidFill>
+                <a:miter lim="800000"/>
+                <a:headEnd/>
+                <a:tailEnd/>
+              </a14:hiddenLine>
+            </a:ext>
+          </a:extLst>
+        </p:spPr>
+        <p:txBody>
+          <a:bodyPr/>
+          <a:lstStyle>
+            <a:lvl1pPr>
+              <a:defRPr>
+                <a:solidFill>
+                  <a:schemeClr val="tx1"/>
+                </a:solidFill>
+                <a:latin typeface="Verdana" panose="020B0604030504040204" pitchFamily="34" charset="0"/>
+              </a:defRPr>
+            </a:lvl1pPr>
+            <a:lvl2pPr marL="742950" indent="-285750">
+              <a:defRPr>
+                <a:solidFill>
+                  <a:schemeClr val="tx1"/>
+                </a:solidFill>
+                <a:latin typeface="Verdana" panose="020B0604030504040204" pitchFamily="34" charset="0"/>
+              </a:defRPr>
+            </a:lvl2pPr>
+            <a:lvl3pPr marL="1143000" indent="-228600">
+              <a:defRPr>
+                <a:solidFill>
+                  <a:schemeClr val="tx1"/>
+                </a:solidFill>
+                <a:latin typeface="Verdana" panose="020B0604030504040204" pitchFamily="34" charset="0"/>
+              </a:defRPr>
+            </a:lvl3pPr>
+            <a:lvl4pPr marL="1600200" indent="-228600">
+              <a:defRPr>
+                <a:solidFill>
+                  <a:schemeClr val="tx1"/>
+                </a:solidFill>
+                <a:latin typeface="Verdana" panose="020B0604030504040204" pitchFamily="34" charset="0"/>
+              </a:defRPr>
+            </a:lvl4pPr>
+            <a:lvl5pPr marL="2057400" indent="-228600">
+              <a:defRPr>
+                <a:solidFill>
+                  <a:schemeClr val="tx1"/>
+                </a:solidFill>
+                <a:latin typeface="Verdana" panose="020B0604030504040204" pitchFamily="34" charset="0"/>
+              </a:defRPr>
+            </a:lvl5pPr>
+            <a:lvl6pPr marL="2514600" indent="-228600" fontAlgn="base">
+              <a:spcBef>
+                <a:spcPct val="0"/>
+              </a:spcBef>
+              <a:spcAft>
+                <a:spcPct val="0"/>
+              </a:spcAft>
+              <a:defRPr>
+                <a:solidFill>
+                  <a:schemeClr val="tx1"/>
+                </a:solidFill>
+                <a:latin typeface="Verdana" panose="020B0604030504040204" pitchFamily="34" charset="0"/>
+              </a:defRPr>
+            </a:lvl6pPr>
+            <a:lvl7pPr marL="2971800" indent="-228600" fontAlgn="base">
+              <a:spcBef>
+                <a:spcPct val="0"/>
+              </a:spcBef>
+              <a:spcAft>
+                <a:spcPct val="0"/>
+              </a:spcAft>
+              <a:defRPr>
+                <a:solidFill>
+                  <a:schemeClr val="tx1"/>
+                </a:solidFill>
+                <a:latin typeface="Verdana" panose="020B0604030504040204" pitchFamily="34" charset="0"/>
+              </a:defRPr>
+            </a:lvl7pPr>
+            <a:lvl8pPr marL="3429000" indent="-228600" fontAlgn="base">
+              <a:spcBef>
+                <a:spcPct val="0"/>
+              </a:spcBef>
+              <a:spcAft>
+                <a:spcPct val="0"/>
+              </a:spcAft>
+              <a:defRPr>
+                <a:solidFill>
+                  <a:schemeClr val="tx1"/>
+                </a:solidFill>
+                <a:latin typeface="Verdana" panose="020B0604030504040204" pitchFamily="34" charset="0"/>
+              </a:defRPr>
+            </a:lvl8pPr>
+            <a:lvl9pPr marL="3886200" indent="-228600" fontAlgn="base">
+              <a:spcBef>
+                <a:spcPct val="0"/>
+              </a:spcBef>
+              <a:spcAft>
+                <a:spcPct val="0"/>
+              </a:spcAft>
+              <a:defRPr>
+                <a:solidFill>
+                  <a:schemeClr val="tx1"/>
+                </a:solidFill>
+                <a:latin typeface="Verdana" panose="020B0604030504040204" pitchFamily="34" charset="0"/>
+              </a:defRPr>
+            </a:lvl9pPr>
+          </a:lstStyle>
+          <a:p>
+            <a:fld id="{55FD9689-D05B-4129-8904-8C79E8CC392F}" type="slidenum">
+              <a:rPr lang="de-DE" altLang="de-DE"/>
+              <a:pPr/>
+              <a:t>11</a:t>
+            </a:fld>
+            <a:endParaRPr lang="de-DE" altLang="de-DE"/>
+          </a:p>
+        </p:txBody>
+      </p:sp>
+      <p:sp>
+        <p:nvSpPr>
+          <p:cNvPr id="20485" name="Datumsplatzhalter 7">
+            <a:extLst>
+              <a:ext uri="{FF2B5EF4-FFF2-40B4-BE49-F238E27FC236}">
+                <a16:creationId xmlns:a16="http://schemas.microsoft.com/office/drawing/2014/main" id="{1FC2F0C8-4B0C-42DE-AB89-6ACFCCE8176A}"/>
+              </a:ext>
+            </a:extLst>
+          </p:cNvPr>
+          <p:cNvSpPr>
+            <a:spLocks noGrp="1"/>
+          </p:cNvSpPr>
+          <p:nvPr>
+            <p:ph type="dt" sz="quarter" idx="14"/>
+          </p:nvPr>
+        </p:nvSpPr>
+        <p:spPr bwMode="auto">
+          <a:noFill/>
+          <a:extLst>
+            <a:ext uri="{909E8E84-426E-40DD-AFC4-6F175D3DCCD1}">
+              <a14:hiddenFill xmlns:a14="http://schemas.microsoft.com/office/drawing/2010/main">
+                <a:solidFill>
+                  <a:srgbClr val="FFFFFF"/>
+                </a:solidFill>
+              </a14:hiddenFill>
+            </a:ext>
+            <a:ext uri="{91240B29-F687-4F45-9708-019B960494DF}">
+              <a14:hiddenLine xmlns:a14="http://schemas.microsoft.com/office/drawing/2010/main" w="9525">
+                <a:solidFill>
+                  <a:srgbClr val="000000"/>
+                </a:solidFill>
+                <a:miter lim="800000"/>
+                <a:headEnd/>
+                <a:tailEnd/>
+              </a14:hiddenLine>
+            </a:ext>
+          </a:extLst>
+        </p:spPr>
+        <p:txBody>
+          <a:bodyPr wrap="square" numCol="1" anchorCtr="0" compatLnSpc="1">
+            <a:prstTxWarp prst="textNoShape">
+              <a:avLst/>
+            </a:prstTxWarp>
+          </a:bodyPr>
+          <a:lstStyle>
+            <a:lvl1pPr>
+              <a:defRPr>
+                <a:solidFill>
+                  <a:schemeClr val="tx1"/>
+                </a:solidFill>
+                <a:latin typeface="Verdana" panose="020B0604030504040204" pitchFamily="34" charset="0"/>
+              </a:defRPr>
+            </a:lvl1pPr>
+            <a:lvl2pPr marL="742950" indent="-285750">
+              <a:defRPr>
+                <a:solidFill>
+                  <a:schemeClr val="tx1"/>
+                </a:solidFill>
+                <a:latin typeface="Verdana" panose="020B0604030504040204" pitchFamily="34" charset="0"/>
+              </a:defRPr>
+            </a:lvl2pPr>
+            <a:lvl3pPr marL="1143000" indent="-228600">
+              <a:defRPr>
+                <a:solidFill>
+                  <a:schemeClr val="tx1"/>
+                </a:solidFill>
+                <a:latin typeface="Verdana" panose="020B0604030504040204" pitchFamily="34" charset="0"/>
+              </a:defRPr>
+            </a:lvl3pPr>
+            <a:lvl4pPr marL="1600200" indent="-228600">
+              <a:defRPr>
+                <a:solidFill>
+                  <a:schemeClr val="tx1"/>
+                </a:solidFill>
+                <a:latin typeface="Verdana" panose="020B0604030504040204" pitchFamily="34" charset="0"/>
+              </a:defRPr>
+            </a:lvl4pPr>
+            <a:lvl5pPr marL="2057400" indent="-228600">
+              <a:defRPr>
+                <a:solidFill>
+                  <a:schemeClr val="tx1"/>
+                </a:solidFill>
+                <a:latin typeface="Verdana" panose="020B0604030504040204" pitchFamily="34" charset="0"/>
+              </a:defRPr>
+            </a:lvl5pPr>
+            <a:lvl6pPr marL="2514600" indent="-228600" fontAlgn="base">
+              <a:spcBef>
+                <a:spcPct val="0"/>
+              </a:spcBef>
+              <a:spcAft>
+                <a:spcPct val="0"/>
+              </a:spcAft>
+              <a:defRPr>
+                <a:solidFill>
+                  <a:schemeClr val="tx1"/>
+                </a:solidFill>
+                <a:latin typeface="Verdana" panose="020B0604030504040204" pitchFamily="34" charset="0"/>
+              </a:defRPr>
+            </a:lvl6pPr>
+            <a:lvl7pPr marL="2971800" indent="-228600" fontAlgn="base">
+              <a:spcBef>
+                <a:spcPct val="0"/>
+              </a:spcBef>
+              <a:spcAft>
+                <a:spcPct val="0"/>
+              </a:spcAft>
+              <a:defRPr>
+                <a:solidFill>
+                  <a:schemeClr val="tx1"/>
+                </a:solidFill>
+                <a:latin typeface="Verdana" panose="020B0604030504040204" pitchFamily="34" charset="0"/>
+              </a:defRPr>
+            </a:lvl7pPr>
+            <a:lvl8pPr marL="3429000" indent="-228600" fontAlgn="base">
+              <a:spcBef>
+                <a:spcPct val="0"/>
+              </a:spcBef>
+              <a:spcAft>
+                <a:spcPct val="0"/>
+              </a:spcAft>
+              <a:defRPr>
+                <a:solidFill>
+                  <a:schemeClr val="tx1"/>
+                </a:solidFill>
+                <a:latin typeface="Verdana" panose="020B0604030504040204" pitchFamily="34" charset="0"/>
+              </a:defRPr>
+            </a:lvl8pPr>
+            <a:lvl9pPr marL="3886200" indent="-228600" fontAlgn="base">
+              <a:spcBef>
+                <a:spcPct val="0"/>
+              </a:spcBef>
+              <a:spcAft>
+                <a:spcPct val="0"/>
+              </a:spcAft>
+              <a:defRPr>
+                <a:solidFill>
+                  <a:schemeClr val="tx1"/>
+                </a:solidFill>
+                <a:latin typeface="Verdana" panose="020B0604030504040204" pitchFamily="34" charset="0"/>
+              </a:defRPr>
+            </a:lvl9pPr>
+          </a:lstStyle>
+          <a:p>
+            <a:pPr fontAlgn="base">
+              <a:spcBef>
+                <a:spcPct val="0"/>
+              </a:spcBef>
+              <a:spcAft>
+                <a:spcPct val="0"/>
+              </a:spcAft>
+            </a:pPr>
+            <a:r>
+              <a:rPr lang="de-DE" altLang="de-DE" dirty="0">
+                <a:solidFill>
+                  <a:schemeClr val="bg1"/>
+                </a:solidFill>
+              </a:rPr>
+              <a:t>02.01.2024</a:t>
+            </a:r>
+          </a:p>
+        </p:txBody>
+      </p:sp>
+      <p:sp>
+        <p:nvSpPr>
+          <p:cNvPr id="20486" name="Fußzeilenplatzhalter 8">
+            <a:extLst>
+              <a:ext uri="{FF2B5EF4-FFF2-40B4-BE49-F238E27FC236}">
+                <a16:creationId xmlns:a16="http://schemas.microsoft.com/office/drawing/2014/main" id="{C75EFC2F-D1C0-4664-AD18-C9477F39DB64}"/>
+              </a:ext>
+            </a:extLst>
+          </p:cNvPr>
+          <p:cNvSpPr>
+            <a:spLocks noGrp="1"/>
+          </p:cNvSpPr>
+          <p:nvPr>
+            <p:ph type="ftr" sz="quarter" idx="15"/>
+          </p:nvPr>
+        </p:nvSpPr>
+        <p:spPr bwMode="auto">
+          <a:xfrm>
+            <a:off x="3599891" y="4818063"/>
+            <a:ext cx="1944216" cy="274637"/>
+          </a:xfrm>
+          <a:noFill/>
+          <a:extLst>
+            <a:ext uri="{909E8E84-426E-40DD-AFC4-6F175D3DCCD1}">
+              <a14:hiddenFill xmlns:a14="http://schemas.microsoft.com/office/drawing/2010/main">
+                <a:solidFill>
+                  <a:srgbClr val="FFFFFF"/>
+                </a:solidFill>
+              </a14:hiddenFill>
+            </a:ext>
+            <a:ext uri="{91240B29-F687-4F45-9708-019B960494DF}">
+              <a14:hiddenLine xmlns:a14="http://schemas.microsoft.com/office/drawing/2010/main" w="9525">
+                <a:solidFill>
+                  <a:srgbClr val="000000"/>
+                </a:solidFill>
+                <a:miter lim="800000"/>
+                <a:headEnd/>
+                <a:tailEnd/>
+              </a14:hiddenLine>
+            </a:ext>
+          </a:extLst>
+        </p:spPr>
+        <p:txBody>
+          <a:bodyPr wrap="square" numCol="1" anchorCtr="0" compatLnSpc="1">
+            <a:prstTxWarp prst="textNoShape">
+              <a:avLst/>
+            </a:prstTxWarp>
+          </a:bodyPr>
+          <a:lstStyle>
+            <a:lvl1pPr>
+              <a:defRPr>
+                <a:solidFill>
+                  <a:schemeClr val="tx1"/>
+                </a:solidFill>
+                <a:latin typeface="Verdana" panose="020B0604030504040204" pitchFamily="34" charset="0"/>
+              </a:defRPr>
+            </a:lvl1pPr>
+            <a:lvl2pPr marL="742950" indent="-285750">
+              <a:defRPr>
+                <a:solidFill>
+                  <a:schemeClr val="tx1"/>
+                </a:solidFill>
+                <a:latin typeface="Verdana" panose="020B0604030504040204" pitchFamily="34" charset="0"/>
+              </a:defRPr>
+            </a:lvl2pPr>
+            <a:lvl3pPr marL="1143000" indent="-228600">
+              <a:defRPr>
+                <a:solidFill>
+                  <a:schemeClr val="tx1"/>
+                </a:solidFill>
+                <a:latin typeface="Verdana" panose="020B0604030504040204" pitchFamily="34" charset="0"/>
+              </a:defRPr>
+            </a:lvl3pPr>
+            <a:lvl4pPr marL="1600200" indent="-228600">
+              <a:defRPr>
+                <a:solidFill>
+                  <a:schemeClr val="tx1"/>
+                </a:solidFill>
+                <a:latin typeface="Verdana" panose="020B0604030504040204" pitchFamily="34" charset="0"/>
+              </a:defRPr>
+            </a:lvl4pPr>
+            <a:lvl5pPr marL="2057400" indent="-228600">
+              <a:defRPr>
+                <a:solidFill>
+                  <a:schemeClr val="tx1"/>
+                </a:solidFill>
+                <a:latin typeface="Verdana" panose="020B0604030504040204" pitchFamily="34" charset="0"/>
+              </a:defRPr>
+            </a:lvl5pPr>
+            <a:lvl6pPr marL="2514600" indent="-228600" fontAlgn="base">
+              <a:spcBef>
+                <a:spcPct val="0"/>
+              </a:spcBef>
+              <a:spcAft>
+                <a:spcPct val="0"/>
+              </a:spcAft>
+              <a:defRPr>
+                <a:solidFill>
+                  <a:schemeClr val="tx1"/>
+                </a:solidFill>
+                <a:latin typeface="Verdana" panose="020B0604030504040204" pitchFamily="34" charset="0"/>
+              </a:defRPr>
+            </a:lvl6pPr>
+            <a:lvl7pPr marL="2971800" indent="-228600" fontAlgn="base">
+              <a:spcBef>
+                <a:spcPct val="0"/>
+              </a:spcBef>
+              <a:spcAft>
+                <a:spcPct val="0"/>
+              </a:spcAft>
+              <a:defRPr>
+                <a:solidFill>
+                  <a:schemeClr val="tx1"/>
+                </a:solidFill>
+                <a:latin typeface="Verdana" panose="020B0604030504040204" pitchFamily="34" charset="0"/>
+              </a:defRPr>
+            </a:lvl7pPr>
+            <a:lvl8pPr marL="3429000" indent="-228600" fontAlgn="base">
+              <a:spcBef>
+                <a:spcPct val="0"/>
+              </a:spcBef>
+              <a:spcAft>
+                <a:spcPct val="0"/>
+              </a:spcAft>
+              <a:defRPr>
+                <a:solidFill>
+                  <a:schemeClr val="tx1"/>
+                </a:solidFill>
+                <a:latin typeface="Verdana" panose="020B0604030504040204" pitchFamily="34" charset="0"/>
+              </a:defRPr>
+            </a:lvl8pPr>
+            <a:lvl9pPr marL="3886200" indent="-228600" fontAlgn="base">
+              <a:spcBef>
+                <a:spcPct val="0"/>
+              </a:spcBef>
+              <a:spcAft>
+                <a:spcPct val="0"/>
+              </a:spcAft>
+              <a:defRPr>
+                <a:solidFill>
+                  <a:schemeClr val="tx1"/>
+                </a:solidFill>
+                <a:latin typeface="Verdana" panose="020B0604030504040204" pitchFamily="34" charset="0"/>
+              </a:defRPr>
+            </a:lvl9pPr>
+          </a:lstStyle>
+          <a:p>
+            <a:pPr fontAlgn="base">
+              <a:spcBef>
+                <a:spcPct val="0"/>
+              </a:spcBef>
+              <a:spcAft>
+                <a:spcPct val="0"/>
+              </a:spcAft>
+            </a:pPr>
+            <a:r>
+              <a:rPr lang="de-DE" altLang="de-DE" dirty="0">
+                <a:solidFill>
+                  <a:schemeClr val="bg2"/>
+                </a:solidFill>
+              </a:rPr>
+              <a:t>Max Sven Freudenberg (566289)</a:t>
+            </a:r>
+          </a:p>
+        </p:txBody>
+      </p:sp>
+      <p:sp>
+        <p:nvSpPr>
+          <p:cNvPr id="3" name="Textfeld 2">
+            <a:extLst>
+              <a:ext uri="{FF2B5EF4-FFF2-40B4-BE49-F238E27FC236}">
+                <a16:creationId xmlns:a16="http://schemas.microsoft.com/office/drawing/2014/main" id="{BFAEE945-0812-47D5-9F0D-F82D1ECF40BC}"/>
+              </a:ext>
+            </a:extLst>
+          </p:cNvPr>
+          <p:cNvSpPr txBox="1"/>
+          <p:nvPr/>
+        </p:nvSpPr>
+        <p:spPr>
+          <a:xfrm>
+            <a:off x="6660232" y="4839965"/>
+            <a:ext cx="1152128" cy="230832"/>
+          </a:xfrm>
+          <a:prstGeom prst="rect">
+            <a:avLst/>
+          </a:prstGeom>
+          <a:noFill/>
+        </p:spPr>
+        <p:txBody>
+          <a:bodyPr wrap="square" rtlCol="0">
+            <a:spAutoFit/>
+          </a:bodyPr>
+          <a:lstStyle/>
+          <a:p>
+            <a:r>
+              <a:rPr lang="de-DE" sz="900" dirty="0">
+                <a:solidFill>
+                  <a:schemeClr val="bg2"/>
+                </a:solidFill>
+              </a:rPr>
+              <a:t>Bachelorseminar</a:t>
+            </a:r>
+          </a:p>
+        </p:txBody>
+      </p:sp>
+      <p:sp>
+        <p:nvSpPr>
+          <p:cNvPr id="7" name="Titel 1">
+            <a:extLst>
+              <a:ext uri="{FF2B5EF4-FFF2-40B4-BE49-F238E27FC236}">
+                <a16:creationId xmlns:a16="http://schemas.microsoft.com/office/drawing/2014/main" id="{4547D962-D3B5-4075-8D99-399B9E4FDAE0}"/>
+              </a:ext>
+            </a:extLst>
+          </p:cNvPr>
+          <p:cNvSpPr>
+            <a:spLocks noGrp="1"/>
+          </p:cNvSpPr>
+          <p:nvPr>
+            <p:ph type="title"/>
+          </p:nvPr>
+        </p:nvSpPr>
+        <p:spPr bwMode="auto">
+          <a:xfrm>
+            <a:off x="720725" y="612775"/>
+            <a:ext cx="7702549" cy="627063"/>
+          </a:xfrm>
+          <a:noFill/>
+          <a:extLst>
+            <a:ext uri="{909E8E84-426E-40DD-AFC4-6F175D3DCCD1}">
+              <a14:hiddenFill xmlns:a14="http://schemas.microsoft.com/office/drawing/2010/main">
+                <a:solidFill>
+                  <a:srgbClr val="FFFFFF"/>
+                </a:solidFill>
+              </a14:hiddenFill>
+            </a:ext>
+            <a:ext uri="{91240B29-F687-4F45-9708-019B960494DF}">
+              <a14:hiddenLine xmlns:a14="http://schemas.microsoft.com/office/drawing/2010/main" w="9525">
+                <a:solidFill>
+                  <a:srgbClr val="000000"/>
+                </a:solidFill>
+                <a:miter lim="800000"/>
+                <a:headEnd/>
+                <a:tailEnd/>
+              </a14:hiddenLine>
+            </a:ext>
+          </a:extLst>
+        </p:spPr>
+        <p:txBody>
+          <a:bodyPr vert="horz" wrap="square" bIns="45720" numCol="1" anchor="t" anchorCtr="0" compatLnSpc="1">
+            <a:prstTxWarp prst="textNoShape">
+              <a:avLst/>
+            </a:prstTxWarp>
+          </a:bodyPr>
+          <a:lstStyle/>
+          <a:p>
+            <a:r>
+              <a:rPr lang="de-DE" altLang="de-DE" sz="2000" dirty="0"/>
+              <a:t>6 Erhoffte Ergebnisse</a:t>
+            </a:r>
+            <a:endParaRPr lang="de-DE" altLang="de-DE" sz="1800" dirty="0"/>
+          </a:p>
+        </p:txBody>
+      </p:sp>
+      <p:sp>
+        <p:nvSpPr>
+          <p:cNvPr id="6" name="Textfeld 5">
+            <a:extLst>
+              <a:ext uri="{FF2B5EF4-FFF2-40B4-BE49-F238E27FC236}">
+                <a16:creationId xmlns:a16="http://schemas.microsoft.com/office/drawing/2014/main" id="{87D07DFC-9E36-499F-A090-F7E5CBBCB27D}"/>
+              </a:ext>
+            </a:extLst>
+          </p:cNvPr>
+          <p:cNvSpPr txBox="1"/>
+          <p:nvPr/>
+        </p:nvSpPr>
+        <p:spPr>
+          <a:xfrm>
+            <a:off x="720726" y="1168965"/>
+            <a:ext cx="7739706" cy="1889235"/>
+          </a:xfrm>
+          <a:prstGeom prst="rect">
+            <a:avLst/>
+          </a:prstGeom>
+          <a:noFill/>
+        </p:spPr>
+        <p:txBody>
+          <a:bodyPr wrap="square" rtlCol="0">
+            <a:spAutoFit/>
+          </a:bodyPr>
+          <a:lstStyle/>
+          <a:p>
+            <a:pPr marL="285750" indent="-285750">
+              <a:lnSpc>
+                <a:spcPct val="150000"/>
+              </a:lnSpc>
+              <a:buFont typeface="Arial" panose="020B0604020202020204" pitchFamily="34" charset="0"/>
+              <a:buChar char="•"/>
+            </a:pPr>
+            <a:r>
+              <a:rPr lang="de-DE" sz="1600" dirty="0"/>
+              <a:t>Erfolgreiche CRUD-Operationen auf Datenbank</a:t>
+            </a:r>
+          </a:p>
+          <a:p>
+            <a:pPr marL="285750" indent="-285750">
+              <a:lnSpc>
+                <a:spcPct val="150000"/>
+              </a:lnSpc>
+              <a:buFont typeface="Arial" panose="020B0604020202020204" pitchFamily="34" charset="0"/>
+              <a:buChar char="•"/>
+            </a:pPr>
+            <a:endParaRPr lang="de-DE" sz="1600" dirty="0"/>
+          </a:p>
+          <a:p>
+            <a:pPr marL="285750" indent="-285750">
+              <a:lnSpc>
+                <a:spcPct val="150000"/>
+              </a:lnSpc>
+              <a:buFont typeface="Arial" panose="020B0604020202020204" pitchFamily="34" charset="0"/>
+              <a:buChar char="•"/>
+            </a:pPr>
+            <a:r>
+              <a:rPr lang="de-DE" sz="1600" dirty="0"/>
+              <a:t>Mandantenfähigkeit</a:t>
+            </a:r>
+          </a:p>
+          <a:p>
+            <a:pPr marL="285750" indent="-285750">
+              <a:lnSpc>
+                <a:spcPct val="150000"/>
+              </a:lnSpc>
+              <a:buFont typeface="Arial" panose="020B0604020202020204" pitchFamily="34" charset="0"/>
+              <a:buChar char="•"/>
+            </a:pPr>
+            <a:endParaRPr lang="de-DE" sz="1600" dirty="0"/>
+          </a:p>
+          <a:p>
+            <a:pPr marL="285750" indent="-285750">
+              <a:lnSpc>
+                <a:spcPct val="150000"/>
+              </a:lnSpc>
+              <a:buFont typeface="Arial" panose="020B0604020202020204" pitchFamily="34" charset="0"/>
+              <a:buChar char="•"/>
+            </a:pPr>
+            <a:r>
+              <a:rPr lang="de-DE" sz="1600" dirty="0"/>
+              <a:t>Datensicherheit: Mandant A kann nicht Daten von Mandant B einsehen</a:t>
+            </a:r>
+          </a:p>
+        </p:txBody>
+      </p:sp>
+    </p:spTree>
+    <p:extLst>
+      <p:ext uri="{BB962C8B-B14F-4D97-AF65-F5344CB8AC3E}">
+        <p14:creationId xmlns:p14="http://schemas.microsoft.com/office/powerpoint/2010/main" val="3006399396"/>
+      </p:ext>
+    </p:extLst>
+  </p:cSld>
+  <p:clrMapOvr>
+    <a:masterClrMapping/>
+  </p:clrMapOvr>
+</p:sld>
+</file>
+
+<file path=ppt/slides/slide12.xml><?xml version="1.0" encoding="utf-8"?>
 <p:sld xmlns:a="http://schemas.openxmlformats.org/drawingml/2006/main" xmlns:r="http://schemas.openxmlformats.org/officeDocument/2006/relationships" xmlns:p="http://schemas.openxmlformats.org/presentationml/2006/main">
   <p:cSld>
     <p:spTree>
@@ -11953,7 +12645,7 @@
         <p:spPr>
           <a:xfrm>
             <a:off x="720726" y="1168965"/>
-            <a:ext cx="7702550" cy="1323439"/>
+            <a:ext cx="7702550" cy="2258567"/>
           </a:xfrm>
           <a:prstGeom prst="rect">
             <a:avLst/>
@@ -11966,48 +12658,69 @@
           </a:bodyPr>
           <a:lstStyle/>
           <a:p>
-            <a:pPr marL="342900" indent="-342900">
-              <a:buAutoNum type="arabicPeriod"/>
+            <a:pPr>
+              <a:lnSpc>
+                <a:spcPct val="150000"/>
+              </a:lnSpc>
             </a:pPr>
             <a:r>
               <a:rPr lang="de-DE" sz="1600" dirty="0"/>
-              <a:t>Titel</a:t>
-            </a:r>
-          </a:p>
-          <a:p>
-            <a:pPr marL="342900" indent="-342900">
-              <a:buAutoNum type="arabicPeriod"/>
+              <a:t>1 Titel</a:t>
+            </a:r>
+          </a:p>
+          <a:p>
+            <a:pPr>
+              <a:lnSpc>
+                <a:spcPct val="150000"/>
+              </a:lnSpc>
             </a:pPr>
             <a:r>
               <a:rPr lang="de-DE" sz="1600" dirty="0"/>
-              <a:t>Abstract</a:t>
-            </a:r>
-          </a:p>
-          <a:p>
-            <a:pPr marL="342900" indent="-342900">
-              <a:buAutoNum type="arabicPeriod"/>
+              <a:t>2 Abstract</a:t>
+            </a:r>
+          </a:p>
+          <a:p>
+            <a:pPr>
+              <a:lnSpc>
+                <a:spcPct val="150000"/>
+              </a:lnSpc>
             </a:pPr>
             <a:r>
               <a:rPr lang="de-DE" sz="1600" dirty="0"/>
-              <a:t>Voraussichtliche Gliederung der Abschlussarbeit</a:t>
-            </a:r>
-          </a:p>
-          <a:p>
-            <a:pPr marL="342900" indent="-342900">
-              <a:buAutoNum type="arabicPeriod"/>
+              <a:t>3 Voraussichtliche Gliederung der Abschlussarbeit</a:t>
+            </a:r>
+          </a:p>
+          <a:p>
+            <a:pPr>
+              <a:lnSpc>
+                <a:spcPct val="150000"/>
+              </a:lnSpc>
             </a:pPr>
             <a:r>
               <a:rPr lang="de-DE" sz="1600" dirty="0"/>
-              <a:t>Datenmodell</a:t>
-            </a:r>
-          </a:p>
-          <a:p>
-            <a:pPr marL="342900" indent="-342900">
-              <a:buAutoNum type="arabicPeriod"/>
+              <a:t>4 Datenmodell</a:t>
+            </a:r>
+          </a:p>
+          <a:p>
+            <a:pPr>
+              <a:lnSpc>
+                <a:spcPct val="150000"/>
+              </a:lnSpc>
             </a:pPr>
             <a:r>
               <a:rPr lang="de-DE" sz="1600" dirty="0"/>
-              <a:t>Prozess des Datenimports</a:t>
+              <a:t>5 Prozess des Datenimports</a:t>
+            </a:r>
+          </a:p>
+          <a:p>
+            <a:pPr>
+              <a:lnSpc>
+                <a:spcPct val="150000"/>
+              </a:lnSpc>
+            </a:pPr>
+            <a:r>
+              <a:rPr lang="de-DE" sz="1600" dirty="0"/>
+              <a:t>6 Erhoffte Ergebnisse</a:t>
             </a:r>
           </a:p>
         </p:txBody>
@@ -12609,7 +13322,7 @@
           <a:p>
             <a:r>
               <a:rPr lang="de-DE" altLang="de-DE" sz="2000" dirty="0"/>
-              <a:t>1. Titel</a:t>
+              <a:t>1 Titel</a:t>
             </a:r>
             <a:endParaRPr lang="de-DE" altLang="de-DE" sz="1800" dirty="0"/>
           </a:p>
@@ -13247,7 +13960,7 @@
           <a:p>
             <a:r>
               <a:rPr lang="de-DE" altLang="de-DE" sz="2000" dirty="0"/>
-              <a:t>2. Abstract</a:t>
+              <a:t>2 Abstract</a:t>
             </a:r>
             <a:endParaRPr lang="de-DE" altLang="de-DE" sz="1800" dirty="0"/>
           </a:p>
@@ -13920,7 +14633,7 @@
           <a:p>
             <a:r>
               <a:rPr lang="de-DE" altLang="de-DE" sz="2000" dirty="0"/>
-              <a:t>3. Voraussichtliche Gliederung der Abschlussarbeit</a:t>
+              <a:t>3 Voraussichtliche Gliederung der Abschlussarbeit</a:t>
             </a:r>
             <a:endParaRPr lang="de-DE" altLang="de-DE" sz="1800" dirty="0"/>
           </a:p>
@@ -15261,7 +15974,7 @@
           <a:p>
             <a:r>
               <a:rPr lang="de-DE" altLang="de-DE" sz="2000" dirty="0"/>
-              <a:t>4. Datenmodell</a:t>
+              <a:t>4 Datenmodell</a:t>
             </a:r>
             <a:endParaRPr lang="de-DE" altLang="de-DE" sz="1800" dirty="0"/>
           </a:p>
@@ -15894,7 +16607,7 @@
           <a:p>
             <a:r>
               <a:rPr lang="de-DE" altLang="de-DE" sz="2000" dirty="0"/>
-              <a:t>4. Datenmodell</a:t>
+              <a:t>4 Datenmodell</a:t>
             </a:r>
             <a:endParaRPr lang="de-DE" altLang="de-DE" sz="1800" dirty="0"/>
           </a:p>
@@ -16527,7 +17240,7 @@
           <a:p>
             <a:r>
               <a:rPr lang="de-DE" altLang="de-DE" sz="2000" dirty="0"/>
-              <a:t>4. Datenmodell</a:t>
+              <a:t>4 Datenmodell</a:t>
             </a:r>
             <a:endParaRPr lang="de-DE" altLang="de-DE" sz="1800" dirty="0"/>
           </a:p>
@@ -17160,7 +17873,7 @@
           <a:p>
             <a:r>
               <a:rPr lang="de-DE" altLang="de-DE" sz="2000" dirty="0"/>
-              <a:t>4. Datenmodell</a:t>
+              <a:t>4 Datenmodell</a:t>
             </a:r>
             <a:endParaRPr lang="de-DE" altLang="de-DE" sz="1800" dirty="0"/>
           </a:p>

</xml_diff>